<commit_message>
Rearranged code and added NRMSE and peak2peak errors
</commit_message>
<xml_diff>
--- a/RA-L Hetro Sensors/pictures/SeismicDart_DR.pptx
+++ b/RA-L Hetro Sensors/pictures/SeismicDart_DR.pptx
@@ -106,7 +106,7 @@
   </p:defaultTextStyle>
   <p:extLst>
     <p:ext uri="{EFAFB233-063F-42B5-8137-9DF3F51BA10A}">
-      <p15:sldGuideLst xmlns:p15="http://schemas.microsoft.com/office/powerpoint/2012/main"/>
+      <p15:sldGuideLst xmlns:p15="http://schemas.microsoft.com/office/powerpoint/2012/main" xmlns=""/>
     </p:ext>
   </p:extLst>
 </p:presentation>
@@ -243,7 +243,7 @@
           <a:p>
             <a:fld id="{D7018A1E-B637-4BD9-BE1A-0386C6BDEFEB}" type="datetimeFigureOut">
               <a:rPr lang="en-US" smtClean="0"/>
-              <a:t>9/10/2016</a:t>
+              <a:t>12/7/16</a:t>
             </a:fld>
             <a:endParaRPr lang="en-US"/>
           </a:p>
@@ -413,7 +413,7 @@
           <a:p>
             <a:fld id="{D7018A1E-B637-4BD9-BE1A-0386C6BDEFEB}" type="datetimeFigureOut">
               <a:rPr lang="en-US" smtClean="0"/>
-              <a:t>9/10/2016</a:t>
+              <a:t>12/7/16</a:t>
             </a:fld>
             <a:endParaRPr lang="en-US"/>
           </a:p>
@@ -593,7 +593,7 @@
           <a:p>
             <a:fld id="{D7018A1E-B637-4BD9-BE1A-0386C6BDEFEB}" type="datetimeFigureOut">
               <a:rPr lang="en-US" smtClean="0"/>
-              <a:t>9/10/2016</a:t>
+              <a:t>12/7/16</a:t>
             </a:fld>
             <a:endParaRPr lang="en-US"/>
           </a:p>
@@ -763,7 +763,7 @@
           <a:p>
             <a:fld id="{D7018A1E-B637-4BD9-BE1A-0386C6BDEFEB}" type="datetimeFigureOut">
               <a:rPr lang="en-US" smtClean="0"/>
-              <a:t>9/10/2016</a:t>
+              <a:t>12/7/16</a:t>
             </a:fld>
             <a:endParaRPr lang="en-US"/>
           </a:p>
@@ -1009,7 +1009,7 @@
           <a:p>
             <a:fld id="{D7018A1E-B637-4BD9-BE1A-0386C6BDEFEB}" type="datetimeFigureOut">
               <a:rPr lang="en-US" smtClean="0"/>
-              <a:t>9/10/2016</a:t>
+              <a:t>12/7/16</a:t>
             </a:fld>
             <a:endParaRPr lang="en-US"/>
           </a:p>
@@ -1241,7 +1241,7 @@
           <a:p>
             <a:fld id="{D7018A1E-B637-4BD9-BE1A-0386C6BDEFEB}" type="datetimeFigureOut">
               <a:rPr lang="en-US" smtClean="0"/>
-              <a:t>9/10/2016</a:t>
+              <a:t>12/7/16</a:t>
             </a:fld>
             <a:endParaRPr lang="en-US"/>
           </a:p>
@@ -1608,7 +1608,7 @@
           <a:p>
             <a:fld id="{D7018A1E-B637-4BD9-BE1A-0386C6BDEFEB}" type="datetimeFigureOut">
               <a:rPr lang="en-US" smtClean="0"/>
-              <a:t>9/10/2016</a:t>
+              <a:t>12/7/16</a:t>
             </a:fld>
             <a:endParaRPr lang="en-US"/>
           </a:p>
@@ -1726,7 +1726,7 @@
           <a:p>
             <a:fld id="{D7018A1E-B637-4BD9-BE1A-0386C6BDEFEB}" type="datetimeFigureOut">
               <a:rPr lang="en-US" smtClean="0"/>
-              <a:t>9/10/2016</a:t>
+              <a:t>12/7/16</a:t>
             </a:fld>
             <a:endParaRPr lang="en-US"/>
           </a:p>
@@ -1821,7 +1821,7 @@
           <a:p>
             <a:fld id="{D7018A1E-B637-4BD9-BE1A-0386C6BDEFEB}" type="datetimeFigureOut">
               <a:rPr lang="en-US" smtClean="0"/>
-              <a:t>9/10/2016</a:t>
+              <a:t>12/7/16</a:t>
             </a:fld>
             <a:endParaRPr lang="en-US"/>
           </a:p>
@@ -2098,7 +2098,7 @@
           <a:p>
             <a:fld id="{D7018A1E-B637-4BD9-BE1A-0386C6BDEFEB}" type="datetimeFigureOut">
               <a:rPr lang="en-US" smtClean="0"/>
-              <a:t>9/10/2016</a:t>
+              <a:t>12/7/16</a:t>
             </a:fld>
             <a:endParaRPr lang="en-US"/>
           </a:p>
@@ -2355,7 +2355,7 @@
           <a:p>
             <a:fld id="{D7018A1E-B637-4BD9-BE1A-0386C6BDEFEB}" type="datetimeFigureOut">
               <a:rPr lang="en-US" smtClean="0"/>
-              <a:t>9/10/2016</a:t>
+              <a:t>12/7/16</a:t>
             </a:fld>
             <a:endParaRPr lang="en-US"/>
           </a:p>
@@ -2568,7 +2568,7 @@
           <a:p>
             <a:fld id="{D7018A1E-B637-4BD9-BE1A-0386C6BDEFEB}" type="datetimeFigureOut">
               <a:rPr lang="en-US" smtClean="0"/>
-              <a:t>9/10/2016</a:t>
+              <a:t>12/7/16</a:t>
             </a:fld>
             <a:endParaRPr lang="en-US"/>
           </a:p>
@@ -3536,12 +3536,23 @@
             <a:p>
               <a:pPr algn="ctr"/>
               <a:r>
-                <a:rPr lang="en-US" sz="3200" dirty="0" smtClean="0"/>
-                <a:t>T = </a:t>
+                <a:rPr lang="en-US" sz="3200" i="1" dirty="0">
+                  <a:latin typeface="Times New Roman"/>
+                  <a:cs typeface="Times New Roman"/>
+                </a:rPr>
+                <a:t>T</a:t>
               </a:r>
               <a:r>
                 <a:rPr lang="en-US" sz="3200" dirty="0" smtClean="0"/>
-                <a:t>10s</a:t>
+                <a:t> </a:t>
+              </a:r>
+              <a:r>
+                <a:rPr lang="en-US" sz="3200" dirty="0" smtClean="0"/>
+                <a:t>= </a:t>
+              </a:r>
+              <a:r>
+                <a:rPr lang="en-US" sz="3200" dirty="0" smtClean="0"/>
+                <a:t>10 s</a:t>
               </a:r>
               <a:endParaRPr lang="en-US" sz="3200" dirty="0" smtClean="0"/>
             </a:p>
@@ -3579,12 +3590,19 @@
             <a:p>
               <a:pPr algn="ctr"/>
               <a:r>
-                <a:rPr lang="en-US" sz="3200" dirty="0" smtClean="0"/>
-                <a:t>T = </a:t>
+                <a:rPr lang="en-US" sz="3200" i="1" dirty="0" smtClean="0">
+                  <a:latin typeface="Times New Roman"/>
+                  <a:cs typeface="Times New Roman"/>
+                </a:rPr>
+                <a:t>T</a:t>
               </a:r>
               <a:r>
                 <a:rPr lang="en-US" sz="3200" dirty="0" smtClean="0"/>
-                <a:t>30s</a:t>
+                <a:t> = </a:t>
+              </a:r>
+              <a:r>
+                <a:rPr lang="en-US" sz="3200" dirty="0" smtClean="0"/>
+                <a:t>30 s</a:t>
               </a:r>
               <a:endParaRPr lang="en-US" sz="3200" dirty="0" smtClean="0"/>
             </a:p>
@@ -3622,12 +3640,23 @@
             <a:p>
               <a:pPr algn="ctr"/>
               <a:r>
-                <a:rPr lang="en-US" sz="3200" dirty="0" smtClean="0"/>
-                <a:t>T = </a:t>
+                <a:rPr lang="en-US" sz="3200" i="1" dirty="0">
+                  <a:latin typeface="Times New Roman"/>
+                  <a:cs typeface="Times New Roman"/>
+                </a:rPr>
+                <a:t>T</a:t>
               </a:r>
               <a:r>
                 <a:rPr lang="en-US" sz="3200" dirty="0" smtClean="0"/>
-                <a:t>35s</a:t>
+                <a:t> </a:t>
+              </a:r>
+              <a:r>
+                <a:rPr lang="en-US" sz="3200" dirty="0" smtClean="0"/>
+                <a:t>= </a:t>
+              </a:r>
+              <a:r>
+                <a:rPr lang="en-US" sz="3200" dirty="0" smtClean="0"/>
+                <a:t>35 s</a:t>
               </a:r>
               <a:endParaRPr lang="en-US" sz="3200" dirty="0" smtClean="0"/>
             </a:p>
@@ -3665,9 +3694,25 @@
             <a:p>
               <a:pPr algn="ctr"/>
               <a:r>
+                <a:rPr lang="en-US" sz="3200" i="1" dirty="0">
+                  <a:latin typeface="Times New Roman"/>
+                  <a:cs typeface="Times New Roman"/>
+                </a:rPr>
+                <a:t>T</a:t>
+              </a:r>
+              <a:r>
                 <a:rPr lang="en-US" sz="3200" dirty="0" smtClean="0"/>
-                <a:t>T = 50s</a:t>
+                <a:t> </a:t>
               </a:r>
+              <a:r>
+                <a:rPr lang="en-US" sz="3200" dirty="0" smtClean="0"/>
+                <a:t>= </a:t>
+              </a:r>
+              <a:r>
+                <a:rPr lang="en-US" sz="3200" dirty="0" smtClean="0"/>
+                <a:t>50 s</a:t>
+              </a:r>
+              <a:endParaRPr lang="en-US" sz="3200" dirty="0" smtClean="0"/>
             </a:p>
             <a:p>
               <a:pPr algn="ctr"/>
@@ -3675,7 +3720,6 @@
                 <a:rPr lang="en-US" sz="3200" dirty="0" smtClean="0"/>
                 <a:t>Landing</a:t>
               </a:r>
-              <a:endParaRPr lang="en-US" sz="3200" dirty="0" smtClean="0"/>
             </a:p>
           </p:txBody>
         </p:sp>
@@ -3736,7 +3780,7 @@
     </a:clrScheme>
     <a:fontScheme name="Office Theme">
       <a:majorFont>
-        <a:latin typeface="Calibri Light" panose="020F0302020204030204"/>
+        <a:latin typeface="Calibri Light"/>
         <a:ea typeface=""/>
         <a:cs typeface=""/>
         <a:font script="Jpan" typeface="ＭＳ Ｐゴシック"/>
@@ -3771,7 +3815,7 @@
         <a:font script="Geor" typeface="Sylfaen"/>
       </a:majorFont>
       <a:minorFont>
-        <a:latin typeface="Calibri" panose="020F0502020204030204"/>
+        <a:latin typeface="Calibri"/>
         <a:ea typeface=""/>
         <a:cs typeface=""/>
         <a:font script="Jpan" typeface="ＭＳ Ｐゴシック"/>
@@ -3948,7 +3992,7 @@
   <a:extraClrSchemeLst/>
   <a:extLst>
     <a:ext uri="{05A4C25C-085E-4340-85A3-A5531E510DB2}">
-      <thm15:themeFamily xmlns:thm15="http://schemas.microsoft.com/office/thememl/2012/main" name="Office Theme" id="{62F939B6-93AF-4DB8-9C6B-D6C7DFDC589F}" vid="{4A3C46E8-61CC-4603-A589-7422A47A8E4A}"/>
+      <thm15:themeFamily xmlns:thm15="http://schemas.microsoft.com/office/thememl/2012/main" xmlns="" name="Office Theme" id="{62F939B6-93AF-4DB8-9C6B-D6C7DFDC589F}" vid="{4A3C46E8-61CC-4603-A589-7422A47A8E4A}"/>
     </a:ext>
   </a:extLst>
 </a:theme>

</xml_diff>